<commit_message>
web ui minor, ppt updated
</commit_message>
<xml_diff>
--- a/How to make twincat-Ecat project.pptx
+++ b/How to make twincat-Ecat project.pptx
@@ -38,23 +38,24 @@
     <p:sldId id="286" r:id="rId32"/>
     <p:sldId id="287" r:id="rId33"/>
     <p:sldId id="288" r:id="rId34"/>
-    <p:sldId id="289" r:id="rId35"/>
-    <p:sldId id="290" r:id="rId36"/>
-    <p:sldId id="291" r:id="rId37"/>
-    <p:sldId id="292" r:id="rId38"/>
-    <p:sldId id="293" r:id="rId39"/>
-    <p:sldId id="294" r:id="rId40"/>
-    <p:sldId id="295" r:id="rId41"/>
-    <p:sldId id="296" r:id="rId42"/>
-    <p:sldId id="299" r:id="rId43"/>
-    <p:sldId id="300" r:id="rId44"/>
-    <p:sldId id="301" r:id="rId45"/>
-    <p:sldId id="302" r:id="rId46"/>
-    <p:sldId id="303" r:id="rId47"/>
-    <p:sldId id="298" r:id="rId48"/>
-    <p:sldId id="297" r:id="rId49"/>
-    <p:sldId id="304" r:id="rId50"/>
-    <p:sldId id="305" r:id="rId51"/>
+    <p:sldId id="306" r:id="rId35"/>
+    <p:sldId id="289" r:id="rId36"/>
+    <p:sldId id="290" r:id="rId37"/>
+    <p:sldId id="291" r:id="rId38"/>
+    <p:sldId id="292" r:id="rId39"/>
+    <p:sldId id="293" r:id="rId40"/>
+    <p:sldId id="294" r:id="rId41"/>
+    <p:sldId id="295" r:id="rId42"/>
+    <p:sldId id="296" r:id="rId43"/>
+    <p:sldId id="299" r:id="rId44"/>
+    <p:sldId id="300" r:id="rId45"/>
+    <p:sldId id="301" r:id="rId46"/>
+    <p:sldId id="302" r:id="rId47"/>
+    <p:sldId id="303" r:id="rId48"/>
+    <p:sldId id="298" r:id="rId49"/>
+    <p:sldId id="297" r:id="rId50"/>
+    <p:sldId id="304" r:id="rId51"/>
+    <p:sldId id="305" r:id="rId52"/>
   </p:sldIdLst>
   <p:sldSz cx="12192000" cy="6858000"/>
   <p:notesSz cx="6858000" cy="9144000"/>
@@ -308,7 +309,7 @@
           <a:p>
             <a:fld id="{6B52F62A-EA05-472D-980E-DBB5104073F7}" type="datetimeFigureOut">
               <a:rPr lang="ko-KR" altLang="en-US" smtClean="0"/>
-              <a:t>2022-01-26</a:t>
+              <a:t>2022-02-09</a:t>
             </a:fld>
             <a:endParaRPr lang="ko-KR" altLang="en-US"/>
           </a:p>
@@ -506,7 +507,7 @@
           <a:p>
             <a:fld id="{6B52F62A-EA05-472D-980E-DBB5104073F7}" type="datetimeFigureOut">
               <a:rPr lang="ko-KR" altLang="en-US" smtClean="0"/>
-              <a:t>2022-01-26</a:t>
+              <a:t>2022-02-09</a:t>
             </a:fld>
             <a:endParaRPr lang="ko-KR" altLang="en-US"/>
           </a:p>
@@ -714,7 +715,7 @@
           <a:p>
             <a:fld id="{6B52F62A-EA05-472D-980E-DBB5104073F7}" type="datetimeFigureOut">
               <a:rPr lang="ko-KR" altLang="en-US" smtClean="0"/>
-              <a:t>2022-01-26</a:t>
+              <a:t>2022-02-09</a:t>
             </a:fld>
             <a:endParaRPr lang="ko-KR" altLang="en-US"/>
           </a:p>
@@ -912,7 +913,7 @@
           <a:p>
             <a:fld id="{6B52F62A-EA05-472D-980E-DBB5104073F7}" type="datetimeFigureOut">
               <a:rPr lang="ko-KR" altLang="en-US" smtClean="0"/>
-              <a:t>2022-01-26</a:t>
+              <a:t>2022-02-09</a:t>
             </a:fld>
             <a:endParaRPr lang="ko-KR" altLang="en-US"/>
           </a:p>
@@ -1187,7 +1188,7 @@
           <a:p>
             <a:fld id="{6B52F62A-EA05-472D-980E-DBB5104073F7}" type="datetimeFigureOut">
               <a:rPr lang="ko-KR" altLang="en-US" smtClean="0"/>
-              <a:t>2022-01-26</a:t>
+              <a:t>2022-02-09</a:t>
             </a:fld>
             <a:endParaRPr lang="ko-KR" altLang="en-US"/>
           </a:p>
@@ -1452,7 +1453,7 @@
           <a:p>
             <a:fld id="{6B52F62A-EA05-472D-980E-DBB5104073F7}" type="datetimeFigureOut">
               <a:rPr lang="ko-KR" altLang="en-US" smtClean="0"/>
-              <a:t>2022-01-26</a:t>
+              <a:t>2022-02-09</a:t>
             </a:fld>
             <a:endParaRPr lang="ko-KR" altLang="en-US"/>
           </a:p>
@@ -1864,7 +1865,7 @@
           <a:p>
             <a:fld id="{6B52F62A-EA05-472D-980E-DBB5104073F7}" type="datetimeFigureOut">
               <a:rPr lang="ko-KR" altLang="en-US" smtClean="0"/>
-              <a:t>2022-01-26</a:t>
+              <a:t>2022-02-09</a:t>
             </a:fld>
             <a:endParaRPr lang="ko-KR" altLang="en-US"/>
           </a:p>
@@ -2005,7 +2006,7 @@
           <a:p>
             <a:fld id="{6B52F62A-EA05-472D-980E-DBB5104073F7}" type="datetimeFigureOut">
               <a:rPr lang="ko-KR" altLang="en-US" smtClean="0"/>
-              <a:t>2022-01-26</a:t>
+              <a:t>2022-02-09</a:t>
             </a:fld>
             <a:endParaRPr lang="ko-KR" altLang="en-US"/>
           </a:p>
@@ -2118,7 +2119,7 @@
           <a:p>
             <a:fld id="{6B52F62A-EA05-472D-980E-DBB5104073F7}" type="datetimeFigureOut">
               <a:rPr lang="ko-KR" altLang="en-US" smtClean="0"/>
-              <a:t>2022-01-26</a:t>
+              <a:t>2022-02-09</a:t>
             </a:fld>
             <a:endParaRPr lang="ko-KR" altLang="en-US"/>
           </a:p>
@@ -2429,7 +2430,7 @@
           <a:p>
             <a:fld id="{6B52F62A-EA05-472D-980E-DBB5104073F7}" type="datetimeFigureOut">
               <a:rPr lang="ko-KR" altLang="en-US" smtClean="0"/>
-              <a:t>2022-01-26</a:t>
+              <a:t>2022-02-09</a:t>
             </a:fld>
             <a:endParaRPr lang="ko-KR" altLang="en-US"/>
           </a:p>
@@ -2717,7 +2718,7 @@
           <a:p>
             <a:fld id="{6B52F62A-EA05-472D-980E-DBB5104073F7}" type="datetimeFigureOut">
               <a:rPr lang="ko-KR" altLang="en-US" smtClean="0"/>
-              <a:t>2022-01-26</a:t>
+              <a:t>2022-02-09</a:t>
             </a:fld>
             <a:endParaRPr lang="ko-KR" altLang="en-US"/>
           </a:p>
@@ -2958,7 +2959,7 @@
           <a:p>
             <a:fld id="{6B52F62A-EA05-472D-980E-DBB5104073F7}" type="datetimeFigureOut">
               <a:rPr lang="ko-KR" altLang="en-US" smtClean="0"/>
-              <a:t>2022-01-26</a:t>
+              <a:t>2022-02-09</a:t>
             </a:fld>
             <a:endParaRPr lang="ko-KR" altLang="en-US"/>
           </a:p>
@@ -10288,7 +10289,22 @@
             <a:endParaRPr lang="en-US" altLang="ko-KR" dirty="0"/>
           </a:p>
           <a:p>
-            <a:endParaRPr lang="en-US" altLang="ko-KR" dirty="0"/>
+            <a:r>
+              <a:rPr lang="ko-KR" altLang="en-US" dirty="0"/>
+              <a:t>로그인 이후 </a:t>
+            </a:r>
+            <a:r>
+              <a:rPr lang="en-US" altLang="ko-KR" dirty="0"/>
+              <a:t>webserver </a:t>
+            </a:r>
+            <a:r>
+              <a:rPr lang="ko-KR" altLang="en-US" dirty="0"/>
+              <a:t>세팅 사용 필요함</a:t>
+            </a:r>
+            <a:r>
+              <a:rPr lang="en-US" altLang="ko-KR" dirty="0"/>
+              <a:t>.</a:t>
+            </a:r>
           </a:p>
         </p:txBody>
       </p:sp>
@@ -10357,6 +10373,241 @@
           <p:cNvPr id="2" name="제목 1">
             <a:extLst>
               <a:ext uri="{FF2B5EF4-FFF2-40B4-BE49-F238E27FC236}">
+                <a16:creationId xmlns:a16="http://schemas.microsoft.com/office/drawing/2014/main" id="{BE621915-FC9E-4987-8833-4F388691B212}"/>
+              </a:ext>
+            </a:extLst>
+          </p:cNvPr>
+          <p:cNvSpPr>
+            <a:spLocks noGrp="1"/>
+          </p:cNvSpPr>
+          <p:nvPr>
+            <p:ph type="title"/>
+          </p:nvPr>
+        </p:nvSpPr>
+        <p:spPr/>
+        <p:txBody>
+          <a:bodyPr/>
+          <a:lstStyle/>
+          <a:p>
+            <a:r>
+              <a:rPr lang="en-US" altLang="ko-KR" dirty="0"/>
+              <a:t>HMI</a:t>
+            </a:r>
+            <a:r>
+              <a:rPr lang="ko-KR" altLang="en-US" dirty="0"/>
+              <a:t> </a:t>
+            </a:r>
+            <a:r>
+              <a:rPr lang="en-US" altLang="ko-KR" dirty="0"/>
+              <a:t>web</a:t>
+            </a:r>
+            <a:r>
+              <a:rPr lang="ko-KR" altLang="en-US" dirty="0"/>
+              <a:t> </a:t>
+            </a:r>
+            <a:r>
+              <a:rPr lang="en-US" altLang="ko-KR" dirty="0"/>
+              <a:t>server</a:t>
+            </a:r>
+            <a:r>
+              <a:rPr lang="ko-KR" altLang="en-US" dirty="0"/>
+              <a:t> </a:t>
+            </a:r>
+            <a:r>
+              <a:rPr lang="en-US" altLang="ko-KR" dirty="0"/>
+              <a:t>setting</a:t>
+            </a:r>
+            <a:endParaRPr lang="ko-KR" altLang="en-US" dirty="0"/>
+          </a:p>
+        </p:txBody>
+      </p:sp>
+      <p:sp>
+        <p:nvSpPr>
+          <p:cNvPr id="3" name="내용 개체 틀 2">
+            <a:extLst>
+              <a:ext uri="{FF2B5EF4-FFF2-40B4-BE49-F238E27FC236}">
+                <a16:creationId xmlns:a16="http://schemas.microsoft.com/office/drawing/2014/main" id="{DEB09126-2FEB-44DD-A7AA-5843C6CE28D2}"/>
+              </a:ext>
+            </a:extLst>
+          </p:cNvPr>
+          <p:cNvSpPr>
+            <a:spLocks noGrp="1"/>
+          </p:cNvSpPr>
+          <p:nvPr>
+            <p:ph idx="1"/>
+          </p:nvPr>
+        </p:nvSpPr>
+        <p:spPr>
+          <a:xfrm>
+            <a:off x="838200" y="1825625"/>
+            <a:ext cx="3031136" cy="4351338"/>
+          </a:xfrm>
+        </p:spPr>
+        <p:txBody>
+          <a:bodyPr/>
+          <a:lstStyle/>
+          <a:p>
+            <a:r>
+              <a:rPr lang="en-US" altLang="ko-KR" dirty="0"/>
+              <a:t>Webserver endpoints</a:t>
+            </a:r>
+            <a:r>
+              <a:rPr lang="ko-KR" altLang="en-US" dirty="0"/>
+              <a:t>에 </a:t>
+            </a:r>
+            <a:r>
+              <a:rPr lang="en-US" altLang="ko-KR" dirty="0">
+                <a:hlinkClick r:id="rId2"/>
+              </a:rPr>
+              <a:t>http://0.0.0.0:1020</a:t>
+            </a:r>
+            <a:r>
+              <a:rPr lang="en-US" altLang="ko-KR" dirty="0"/>
+              <a:t> </a:t>
+            </a:r>
+            <a:r>
+              <a:rPr lang="ko-KR" altLang="en-US" dirty="0"/>
+              <a:t>추가 필요</a:t>
+            </a:r>
+            <a:r>
+              <a:rPr lang="en-US" altLang="ko-KR" dirty="0"/>
+              <a:t>.</a:t>
+            </a:r>
+          </a:p>
+          <a:p>
+            <a:r>
+              <a:rPr lang="en-US" altLang="ko-KR" dirty="0"/>
+              <a:t>0.0.0.0 (</a:t>
+            </a:r>
+            <a:r>
+              <a:rPr lang="ko-KR" altLang="en-US" dirty="0"/>
+              <a:t>외부 네트워크에서</a:t>
+            </a:r>
+            <a:r>
+              <a:rPr lang="en-US" altLang="ko-KR" dirty="0"/>
+              <a:t> </a:t>
+            </a:r>
+            <a:r>
+              <a:rPr lang="ko-KR" altLang="en-US" dirty="0"/>
+              <a:t>연결용 </a:t>
+            </a:r>
+            <a:r>
+              <a:rPr lang="en-US" altLang="ko-KR" dirty="0" err="1"/>
+              <a:t>ip</a:t>
+            </a:r>
+            <a:r>
+              <a:rPr lang="ko-KR" altLang="en-US" dirty="0"/>
+              <a:t>주소</a:t>
+            </a:r>
+            <a:r>
+              <a:rPr lang="en-US" altLang="ko-KR" dirty="0"/>
+              <a:t>)</a:t>
+            </a:r>
+          </a:p>
+          <a:p>
+            <a:r>
+              <a:rPr lang="en-US" altLang="ko-KR" dirty="0"/>
+              <a:t>1020 </a:t>
+            </a:r>
+            <a:r>
+              <a:rPr lang="ko-KR" altLang="en-US" dirty="0"/>
+              <a:t>포트</a:t>
+            </a:r>
+            <a:r>
+              <a:rPr lang="en-US" altLang="ko-KR" dirty="0"/>
+              <a:t>(</a:t>
+            </a:r>
+            <a:r>
+              <a:rPr lang="ko-KR" altLang="en-US" dirty="0"/>
+              <a:t>빈 포트</a:t>
+            </a:r>
+            <a:r>
+              <a:rPr lang="en-US" altLang="ko-KR" dirty="0"/>
+              <a:t> </a:t>
+            </a:r>
+            <a:r>
+              <a:rPr lang="en-US" altLang="ko-KR" dirty="0" err="1"/>
+              <a:t>hmi</a:t>
+            </a:r>
+            <a:r>
+              <a:rPr lang="ko-KR" altLang="en-US" dirty="0"/>
+              <a:t> 추천 포트임</a:t>
+            </a:r>
+            <a:r>
+              <a:rPr lang="en-US" altLang="ko-KR" dirty="0"/>
+              <a:t>)</a:t>
+            </a:r>
+          </a:p>
+          <a:p>
+            <a:endParaRPr lang="ko-KR" altLang="en-US" dirty="0"/>
+          </a:p>
+        </p:txBody>
+      </p:sp>
+      <p:pic>
+        <p:nvPicPr>
+          <p:cNvPr id="7" name="그림 6">
+            <a:extLst>
+              <a:ext uri="{FF2B5EF4-FFF2-40B4-BE49-F238E27FC236}">
+                <a16:creationId xmlns:a16="http://schemas.microsoft.com/office/drawing/2014/main" id="{BED50D3A-04F3-4CFA-BC4E-28BA64BCD6D7}"/>
+              </a:ext>
+            </a:extLst>
+          </p:cNvPr>
+          <p:cNvPicPr>
+            <a:picLocks noChangeAspect="1"/>
+          </p:cNvPicPr>
+          <p:nvPr/>
+        </p:nvPicPr>
+        <p:blipFill>
+          <a:blip r:embed="rId3"/>
+          <a:stretch>
+            <a:fillRect/>
+          </a:stretch>
+        </p:blipFill>
+        <p:spPr>
+          <a:xfrm>
+            <a:off x="3869336" y="1475083"/>
+            <a:ext cx="7484464" cy="5052422"/>
+          </a:xfrm>
+          <a:prstGeom prst="rect">
+            <a:avLst/>
+          </a:prstGeom>
+        </p:spPr>
+      </p:pic>
+    </p:spTree>
+    <p:extLst>
+      <p:ext uri="{BB962C8B-B14F-4D97-AF65-F5344CB8AC3E}">
+        <p14:creationId xmlns:p14="http://schemas.microsoft.com/office/powerpoint/2010/main" val="2910647285"/>
+      </p:ext>
+    </p:extLst>
+  </p:cSld>
+  <p:clrMapOvr>
+    <a:masterClrMapping/>
+  </p:clrMapOvr>
+</p:sld>
+</file>
+
+<file path=ppt/slides/slide35.xml><?xml version="1.0" encoding="utf-8"?>
+<p:sld xmlns:a="http://schemas.openxmlformats.org/drawingml/2006/main" xmlns:r="http://schemas.openxmlformats.org/officeDocument/2006/relationships" xmlns:p="http://schemas.openxmlformats.org/presentationml/2006/main">
+  <p:cSld>
+    <p:spTree>
+      <p:nvGrpSpPr>
+        <p:cNvPr id="1" name=""/>
+        <p:cNvGrpSpPr/>
+        <p:nvPr/>
+      </p:nvGrpSpPr>
+      <p:grpSpPr>
+        <a:xfrm>
+          <a:off x="0" y="0"/>
+          <a:ext cx="0" cy="0"/>
+          <a:chOff x="0" y="0"/>
+          <a:chExt cx="0" cy="0"/>
+        </a:xfrm>
+      </p:grpSpPr>
+      <p:sp>
+        <p:nvSpPr>
+          <p:cNvPr id="2" name="제목 1">
+            <a:extLst>
+              <a:ext uri="{FF2B5EF4-FFF2-40B4-BE49-F238E27FC236}">
                 <a16:creationId xmlns:a16="http://schemas.microsoft.com/office/drawing/2014/main" id="{2F22C08F-C9C2-44FE-92EA-8D50BE3C14DE}"/>
               </a:ext>
             </a:extLst>
@@ -10463,7 +10714,7 @@
 </p:sld>
 </file>
 
-<file path=ppt/slides/slide35.xml><?xml version="1.0" encoding="utf-8"?>
+<file path=ppt/slides/slide36.xml><?xml version="1.0" encoding="utf-8"?>
 <p:sld xmlns:a="http://schemas.openxmlformats.org/drawingml/2006/main" xmlns:r="http://schemas.openxmlformats.org/officeDocument/2006/relationships" xmlns:p="http://schemas.openxmlformats.org/presentationml/2006/main">
   <p:cSld>
     <p:spTree>
@@ -10630,7 +10881,7 @@
 </p:sld>
 </file>
 
-<file path=ppt/slides/slide36.xml><?xml version="1.0" encoding="utf-8"?>
+<file path=ppt/slides/slide37.xml><?xml version="1.0" encoding="utf-8"?>
 <p:sld xmlns:a="http://schemas.openxmlformats.org/drawingml/2006/main" xmlns:r="http://schemas.openxmlformats.org/officeDocument/2006/relationships" xmlns:p="http://schemas.openxmlformats.org/presentationml/2006/main">
   <p:cSld>
     <p:spTree>
@@ -10816,7 +11067,7 @@
 </p:sld>
 </file>
 
-<file path=ppt/slides/slide37.xml><?xml version="1.0" encoding="utf-8"?>
+<file path=ppt/slides/slide38.xml><?xml version="1.0" encoding="utf-8"?>
 <p:sld xmlns:a="http://schemas.openxmlformats.org/drawingml/2006/main" xmlns:r="http://schemas.openxmlformats.org/officeDocument/2006/relationships" xmlns:p="http://schemas.openxmlformats.org/presentationml/2006/main">
   <p:cSld>
     <p:spTree>
@@ -11087,154 +11338,6 @@
     <p:extLst>
       <p:ext uri="{BB962C8B-B14F-4D97-AF65-F5344CB8AC3E}">
         <p14:creationId xmlns:p14="http://schemas.microsoft.com/office/powerpoint/2010/main" val="1146128494"/>
-      </p:ext>
-    </p:extLst>
-  </p:cSld>
-  <p:clrMapOvr>
-    <a:masterClrMapping/>
-  </p:clrMapOvr>
-</p:sld>
-</file>
-
-<file path=ppt/slides/slide38.xml><?xml version="1.0" encoding="utf-8"?>
-<p:sld xmlns:a="http://schemas.openxmlformats.org/drawingml/2006/main" xmlns:r="http://schemas.openxmlformats.org/officeDocument/2006/relationships" xmlns:p="http://schemas.openxmlformats.org/presentationml/2006/main">
-  <p:cSld>
-    <p:spTree>
-      <p:nvGrpSpPr>
-        <p:cNvPr id="1" name=""/>
-        <p:cNvGrpSpPr/>
-        <p:nvPr/>
-      </p:nvGrpSpPr>
-      <p:grpSpPr>
-        <a:xfrm>
-          <a:off x="0" y="0"/>
-          <a:ext cx="0" cy="0"/>
-          <a:chOff x="0" y="0"/>
-          <a:chExt cx="0" cy="0"/>
-        </a:xfrm>
-      </p:grpSpPr>
-      <p:sp>
-        <p:nvSpPr>
-          <p:cNvPr id="2" name="제목 1">
-            <a:extLst>
-              <a:ext uri="{FF2B5EF4-FFF2-40B4-BE49-F238E27FC236}">
-                <a16:creationId xmlns:a16="http://schemas.microsoft.com/office/drawing/2014/main" id="{5ACEE5C4-A64C-4BA5-B60E-5E125B1ADB6A}"/>
-              </a:ext>
-            </a:extLst>
-          </p:cNvPr>
-          <p:cNvSpPr>
-            <a:spLocks noGrp="1"/>
-          </p:cNvSpPr>
-          <p:nvPr>
-            <p:ph type="title"/>
-          </p:nvPr>
-        </p:nvSpPr>
-        <p:spPr/>
-        <p:txBody>
-          <a:bodyPr/>
-          <a:lstStyle/>
-          <a:p>
-            <a:r>
-              <a:rPr lang="ko-KR" altLang="en-US" dirty="0"/>
-              <a:t>방화벽 설정</a:t>
-            </a:r>
-          </a:p>
-        </p:txBody>
-      </p:sp>
-      <p:sp>
-        <p:nvSpPr>
-          <p:cNvPr id="3" name="내용 개체 틀 2">
-            <a:extLst>
-              <a:ext uri="{FF2B5EF4-FFF2-40B4-BE49-F238E27FC236}">
-                <a16:creationId xmlns:a16="http://schemas.microsoft.com/office/drawing/2014/main" id="{860ECD01-A290-47BA-B192-5584997A13AA}"/>
-              </a:ext>
-            </a:extLst>
-          </p:cNvPr>
-          <p:cNvSpPr>
-            <a:spLocks noGrp="1"/>
-          </p:cNvSpPr>
-          <p:nvPr>
-            <p:ph idx="1"/>
-          </p:nvPr>
-        </p:nvSpPr>
-        <p:spPr>
-          <a:xfrm>
-            <a:off x="838200" y="1825625"/>
-            <a:ext cx="4029075" cy="4351338"/>
-          </a:xfrm>
-        </p:spPr>
-        <p:txBody>
-          <a:bodyPr/>
-          <a:lstStyle/>
-          <a:p>
-            <a:r>
-              <a:rPr lang="ko-KR" altLang="en-US" dirty="0" err="1"/>
-              <a:t>핸드폰등의</a:t>
-            </a:r>
-            <a:r>
-              <a:rPr lang="ko-KR" altLang="en-US" dirty="0"/>
-              <a:t> 외부에서 앱 구동을 하기위한 방화벽설정 </a:t>
-            </a:r>
-            <a:endParaRPr lang="en-US" altLang="ko-KR" dirty="0"/>
-          </a:p>
-          <a:p>
-            <a:r>
-              <a:rPr lang="en-US" altLang="ko-KR" dirty="0"/>
-              <a:t>1020</a:t>
-            </a:r>
-            <a:r>
-              <a:rPr lang="ko-KR" altLang="en-US" dirty="0"/>
-              <a:t>포트 </a:t>
-            </a:r>
-            <a:r>
-              <a:rPr lang="ko-KR" altLang="en-US" dirty="0" err="1"/>
-              <a:t>인바운드</a:t>
-            </a:r>
-            <a:r>
-              <a:rPr lang="ko-KR" altLang="en-US" dirty="0"/>
-              <a:t> 룰 생성 필요</a:t>
-            </a:r>
-            <a:endParaRPr lang="en-US" altLang="ko-KR" dirty="0"/>
-          </a:p>
-          <a:p>
-            <a:endParaRPr lang="ko-KR" altLang="en-US" dirty="0"/>
-          </a:p>
-        </p:txBody>
-      </p:sp>
-      <p:pic>
-        <p:nvPicPr>
-          <p:cNvPr id="7" name="그림 6">
-            <a:extLst>
-              <a:ext uri="{FF2B5EF4-FFF2-40B4-BE49-F238E27FC236}">
-                <a16:creationId xmlns:a16="http://schemas.microsoft.com/office/drawing/2014/main" id="{6EED4C19-BB55-441F-AB1B-8DC92549DF6C}"/>
-              </a:ext>
-            </a:extLst>
-          </p:cNvPr>
-          <p:cNvPicPr>
-            <a:picLocks noChangeAspect="1"/>
-          </p:cNvPicPr>
-          <p:nvPr/>
-        </p:nvPicPr>
-        <p:blipFill>
-          <a:blip r:embed="rId2"/>
-          <a:stretch>
-            <a:fillRect/>
-          </a:stretch>
-        </p:blipFill>
-        <p:spPr>
-          <a:xfrm>
-            <a:off x="5070934" y="1302713"/>
-            <a:ext cx="6778166" cy="4874250"/>
-          </a:xfrm>
-          <a:prstGeom prst="rect">
-            <a:avLst/>
-          </a:prstGeom>
-        </p:spPr>
-      </p:pic>
-    </p:spTree>
-    <p:extLst>
-      <p:ext uri="{BB962C8B-B14F-4D97-AF65-F5344CB8AC3E}">
-        <p14:creationId xmlns:p14="http://schemas.microsoft.com/office/powerpoint/2010/main" val="405251225"/>
       </p:ext>
     </p:extLst>
   </p:cSld>
@@ -11266,7 +11369,7 @@
           <p:cNvPr id="2" name="제목 1">
             <a:extLst>
               <a:ext uri="{FF2B5EF4-FFF2-40B4-BE49-F238E27FC236}">
-                <a16:creationId xmlns:a16="http://schemas.microsoft.com/office/drawing/2014/main" id="{F88815C5-6E4D-43F6-813A-BFAEBDC9A999}"/>
+                <a16:creationId xmlns:a16="http://schemas.microsoft.com/office/drawing/2014/main" id="{5ACEE5C4-A64C-4BA5-B60E-5E125B1ADB6A}"/>
               </a:ext>
             </a:extLst>
           </p:cNvPr>
@@ -11283,12 +11386,8 @@
           <a:lstStyle/>
           <a:p>
             <a:r>
-              <a:rPr lang="en-US" altLang="ko-KR" dirty="0"/>
-              <a:t>Ads</a:t>
-            </a:r>
-            <a:r>
-              <a:rPr lang="ko-KR" altLang="en-US" dirty="0"/>
-              <a:t> 심볼 연결</a:t>
+              <a:rPr lang="ko-KR" altLang="en-US" dirty="0"/>
+              <a:t>방화벽 설정</a:t>
             </a:r>
           </a:p>
         </p:txBody>
@@ -11298,7 +11397,7 @@
           <p:cNvPr id="3" name="내용 개체 틀 2">
             <a:extLst>
               <a:ext uri="{FF2B5EF4-FFF2-40B4-BE49-F238E27FC236}">
-                <a16:creationId xmlns:a16="http://schemas.microsoft.com/office/drawing/2014/main" id="{26336B15-0F84-4BA6-971C-D049B01D0788}"/>
+                <a16:creationId xmlns:a16="http://schemas.microsoft.com/office/drawing/2014/main" id="{860ECD01-A290-47BA-B192-5584997A13AA}"/>
               </a:ext>
             </a:extLst>
           </p:cNvPr>
@@ -11312,137 +11411,53 @@
         <p:spPr>
           <a:xfrm>
             <a:off x="838200" y="1825625"/>
-            <a:ext cx="4171950" cy="4351338"/>
+            <a:ext cx="4029075" cy="4351338"/>
           </a:xfrm>
         </p:spPr>
         <p:txBody>
-          <a:bodyPr>
-            <a:normAutofit lnSpcReduction="10000"/>
-          </a:bodyPr>
+          <a:bodyPr/>
           <a:lstStyle/>
           <a:p>
             <a:r>
-              <a:rPr lang="ko-KR" altLang="en-US" dirty="0"/>
-              <a:t>서버 </a:t>
-            </a:r>
-            <a:r>
-              <a:rPr lang="en-US" altLang="ko-KR" dirty="0"/>
-              <a:t>config </a:t>
-            </a:r>
-            <a:r>
-              <a:rPr lang="ko-KR" altLang="en-US" dirty="0"/>
-              <a:t>페이지  </a:t>
+              <a:rPr lang="ko-KR" altLang="en-US" dirty="0" err="1"/>
+              <a:t>핸드폰등의</a:t>
+            </a:r>
+            <a:r>
+              <a:rPr lang="ko-KR" altLang="en-US" dirty="0"/>
+              <a:t> 외부에서 앱 구동을 하기위한 방화벽설정 </a:t>
             </a:r>
             <a:endParaRPr lang="en-US" altLang="ko-KR" dirty="0"/>
           </a:p>
           <a:p>
             <a:r>
               <a:rPr lang="en-US" altLang="ko-KR" dirty="0"/>
-              <a:t>ADS</a:t>
-            </a:r>
-            <a:r>
-              <a:rPr lang="ko-KR" altLang="en-US" dirty="0"/>
-              <a:t>탭 </a:t>
+              <a:t>1020</a:t>
+            </a:r>
+            <a:r>
+              <a:rPr lang="ko-KR" altLang="en-US" dirty="0"/>
+              <a:t>포트 </a:t>
+            </a:r>
+            <a:r>
+              <a:rPr lang="ko-KR" altLang="en-US" dirty="0" err="1"/>
+              <a:t>인바운드</a:t>
+            </a:r>
+            <a:r>
+              <a:rPr lang="ko-KR" altLang="en-US" dirty="0"/>
+              <a:t> 룰 생성 필요</a:t>
             </a:r>
             <a:endParaRPr lang="en-US" altLang="ko-KR" dirty="0"/>
           </a:p>
           <a:p>
-            <a:r>
-              <a:rPr lang="en-US" altLang="ko-KR" dirty="0"/>
-              <a:t>Runtime </a:t>
-            </a:r>
-          </a:p>
-          <a:p>
-            <a:r>
-              <a:rPr lang="en-US" altLang="ko-KR" dirty="0"/>
-              <a:t>PLC1</a:t>
-            </a:r>
-            <a:r>
-              <a:rPr lang="ko-KR" altLang="en-US" dirty="0"/>
-              <a:t>또는 </a:t>
-            </a:r>
-            <a:r>
-              <a:rPr lang="en-US" altLang="ko-KR" dirty="0"/>
-              <a:t>add runtime</a:t>
-            </a:r>
-            <a:r>
-              <a:rPr lang="ko-KR" altLang="en-US" dirty="0"/>
-              <a:t>으로 런타임 연결 </a:t>
-            </a:r>
-            <a:endParaRPr lang="en-US" altLang="ko-KR" dirty="0"/>
-          </a:p>
-          <a:p>
-            <a:r>
-              <a:rPr lang="ko-KR" altLang="en-US" dirty="0"/>
-              <a:t>포트 </a:t>
-            </a:r>
-            <a:r>
-              <a:rPr lang="ko-KR" altLang="en-US" dirty="0" err="1"/>
-              <a:t>클릭시</a:t>
-            </a:r>
-            <a:r>
-              <a:rPr lang="ko-KR" altLang="en-US" dirty="0"/>
-              <a:t> </a:t>
-            </a:r>
-            <a:r>
-              <a:rPr lang="en-US" altLang="ko-KR" dirty="0" err="1"/>
-              <a:t>c++</a:t>
-            </a:r>
-            <a:r>
-              <a:rPr lang="en-US" altLang="ko-KR" dirty="0"/>
-              <a:t>task </a:t>
-            </a:r>
-            <a:r>
-              <a:rPr lang="ko-KR" altLang="en-US" dirty="0"/>
-              <a:t>클릭</a:t>
-            </a:r>
-            <a:endParaRPr lang="en-US" altLang="ko-KR" dirty="0"/>
-          </a:p>
-          <a:p>
-            <a:r>
-              <a:rPr lang="ko-KR" altLang="en-US" dirty="0"/>
-              <a:t>연결</a:t>
-            </a:r>
-            <a:endParaRPr lang="en-US" altLang="ko-KR" dirty="0"/>
-          </a:p>
-          <a:p>
-            <a:r>
-              <a:rPr lang="ko-KR" altLang="en-US" dirty="0"/>
-              <a:t>포트 </a:t>
-            </a:r>
-            <a:r>
-              <a:rPr lang="ko-KR" altLang="en-US" dirty="0" err="1"/>
-              <a:t>검색시</a:t>
-            </a:r>
-            <a:r>
-              <a:rPr lang="ko-KR" altLang="en-US" dirty="0"/>
-              <a:t> </a:t>
-            </a:r>
-            <a:r>
-              <a:rPr lang="ko-KR" altLang="en-US" dirty="0" err="1"/>
-              <a:t>트윈캣</a:t>
-            </a:r>
-            <a:r>
-              <a:rPr lang="ko-KR" altLang="en-US" dirty="0"/>
-              <a:t> 런타임 </a:t>
-            </a:r>
-            <a:r>
-              <a:rPr lang="ko-KR" altLang="en-US" dirty="0" err="1"/>
-              <a:t>실행중이여야</a:t>
-            </a:r>
-            <a:r>
-              <a:rPr lang="ko-KR" altLang="en-US" dirty="0"/>
-              <a:t> 함</a:t>
-            </a:r>
+            <a:endParaRPr lang="ko-KR" altLang="en-US" dirty="0"/>
           </a:p>
         </p:txBody>
       </p:sp>
       <p:pic>
         <p:nvPicPr>
-          <p:cNvPr id="5" name="그림 4">
-            <a:extLst>
-              <a:ext uri="{FF2B5EF4-FFF2-40B4-BE49-F238E27FC236}">
-                <a16:creationId xmlns:a16="http://schemas.microsoft.com/office/drawing/2014/main" id="{4C21AD43-67D5-4FDD-AB4F-2C4581CCF554}"/>
+          <p:cNvPr id="7" name="그림 6">
+            <a:extLst>
+              <a:ext uri="{FF2B5EF4-FFF2-40B4-BE49-F238E27FC236}">
+                <a16:creationId xmlns:a16="http://schemas.microsoft.com/office/drawing/2014/main" id="{6EED4C19-BB55-441F-AB1B-8DC92549DF6C}"/>
               </a:ext>
             </a:extLst>
           </p:cNvPr>
@@ -11459,63 +11474,18 @@
         </p:blipFill>
         <p:spPr>
           <a:xfrm>
-            <a:off x="5269776" y="1018778"/>
-            <a:ext cx="6569799" cy="4820444"/>
+            <a:off x="5070934" y="1302713"/>
+            <a:ext cx="6778166" cy="4874250"/>
           </a:xfrm>
           <a:prstGeom prst="rect">
             <a:avLst/>
           </a:prstGeom>
         </p:spPr>
       </p:pic>
-      <p:pic>
-        <p:nvPicPr>
-          <p:cNvPr id="3074" name="Picture 2">
-            <a:extLst>
-              <a:ext uri="{FF2B5EF4-FFF2-40B4-BE49-F238E27FC236}">
-                <a16:creationId xmlns:a16="http://schemas.microsoft.com/office/drawing/2014/main" id="{9D03A126-1EA0-408E-BC32-76CF3FDFD4E5}"/>
-              </a:ext>
-            </a:extLst>
-          </p:cNvPr>
-          <p:cNvPicPr>
-            <a:picLocks noChangeAspect="1" noChangeArrowheads="1"/>
-          </p:cNvPicPr>
-          <p:nvPr/>
-        </p:nvPicPr>
-        <p:blipFill rotWithShape="1">
-          <a:blip r:embed="rId3">
-            <a:extLst>
-              <a:ext uri="{28A0092B-C50C-407E-A947-70E740481C1C}">
-                <a14:useLocalDpi xmlns:a14="http://schemas.microsoft.com/office/drawing/2010/main" val="0"/>
-              </a:ext>
-            </a:extLst>
-          </a:blip>
-          <a:srcRect t="48586"/>
-          <a:stretch/>
-        </p:blipFill>
-        <p:spPr bwMode="auto">
-          <a:xfrm>
-            <a:off x="9005888" y="5648325"/>
-            <a:ext cx="2547937" cy="762268"/>
-          </a:xfrm>
-          <a:prstGeom prst="rect">
-            <a:avLst/>
-          </a:prstGeom>
-          <a:noFill/>
-          <a:extLst>
-            <a:ext uri="{909E8E84-426E-40DD-AFC4-6F175D3DCCD1}">
-              <a14:hiddenFill xmlns:a14="http://schemas.microsoft.com/office/drawing/2010/main">
-                <a:solidFill>
-                  <a:srgbClr val="FFFFFF"/>
-                </a:solidFill>
-              </a14:hiddenFill>
-            </a:ext>
-          </a:extLst>
-        </p:spPr>
-      </p:pic>
     </p:spTree>
     <p:extLst>
       <p:ext uri="{BB962C8B-B14F-4D97-AF65-F5344CB8AC3E}">
-        <p14:creationId xmlns:p14="http://schemas.microsoft.com/office/powerpoint/2010/main" val="2479386598"/>
+        <p14:creationId xmlns:p14="http://schemas.microsoft.com/office/powerpoint/2010/main" val="405251225"/>
       </p:ext>
     </p:extLst>
   </p:cSld>
@@ -11750,6 +11720,287 @@
           <p:cNvPr id="2" name="제목 1">
             <a:extLst>
               <a:ext uri="{FF2B5EF4-FFF2-40B4-BE49-F238E27FC236}">
+                <a16:creationId xmlns:a16="http://schemas.microsoft.com/office/drawing/2014/main" id="{F88815C5-6E4D-43F6-813A-BFAEBDC9A999}"/>
+              </a:ext>
+            </a:extLst>
+          </p:cNvPr>
+          <p:cNvSpPr>
+            <a:spLocks noGrp="1"/>
+          </p:cNvSpPr>
+          <p:nvPr>
+            <p:ph type="title"/>
+          </p:nvPr>
+        </p:nvSpPr>
+        <p:spPr/>
+        <p:txBody>
+          <a:bodyPr/>
+          <a:lstStyle/>
+          <a:p>
+            <a:r>
+              <a:rPr lang="en-US" altLang="ko-KR" dirty="0"/>
+              <a:t>Ads</a:t>
+            </a:r>
+            <a:r>
+              <a:rPr lang="ko-KR" altLang="en-US" dirty="0"/>
+              <a:t> 심볼 연결</a:t>
+            </a:r>
+          </a:p>
+        </p:txBody>
+      </p:sp>
+      <p:sp>
+        <p:nvSpPr>
+          <p:cNvPr id="3" name="내용 개체 틀 2">
+            <a:extLst>
+              <a:ext uri="{FF2B5EF4-FFF2-40B4-BE49-F238E27FC236}">
+                <a16:creationId xmlns:a16="http://schemas.microsoft.com/office/drawing/2014/main" id="{26336B15-0F84-4BA6-971C-D049B01D0788}"/>
+              </a:ext>
+            </a:extLst>
+          </p:cNvPr>
+          <p:cNvSpPr>
+            <a:spLocks noGrp="1"/>
+          </p:cNvSpPr>
+          <p:nvPr>
+            <p:ph idx="1"/>
+          </p:nvPr>
+        </p:nvSpPr>
+        <p:spPr>
+          <a:xfrm>
+            <a:off x="838200" y="1825625"/>
+            <a:ext cx="4171950" cy="4351338"/>
+          </a:xfrm>
+        </p:spPr>
+        <p:txBody>
+          <a:bodyPr>
+            <a:normAutofit lnSpcReduction="10000"/>
+          </a:bodyPr>
+          <a:lstStyle/>
+          <a:p>
+            <a:r>
+              <a:rPr lang="ko-KR" altLang="en-US" dirty="0"/>
+              <a:t>서버 </a:t>
+            </a:r>
+            <a:r>
+              <a:rPr lang="en-US" altLang="ko-KR" dirty="0"/>
+              <a:t>config </a:t>
+            </a:r>
+            <a:r>
+              <a:rPr lang="ko-KR" altLang="en-US" dirty="0"/>
+              <a:t>페이지  </a:t>
+            </a:r>
+            <a:endParaRPr lang="en-US" altLang="ko-KR" dirty="0"/>
+          </a:p>
+          <a:p>
+            <a:r>
+              <a:rPr lang="en-US" altLang="ko-KR" dirty="0"/>
+              <a:t>ADS</a:t>
+            </a:r>
+            <a:r>
+              <a:rPr lang="ko-KR" altLang="en-US" dirty="0"/>
+              <a:t>탭 </a:t>
+            </a:r>
+            <a:endParaRPr lang="en-US" altLang="ko-KR" dirty="0"/>
+          </a:p>
+          <a:p>
+            <a:r>
+              <a:rPr lang="en-US" altLang="ko-KR" dirty="0"/>
+              <a:t>Runtime </a:t>
+            </a:r>
+          </a:p>
+          <a:p>
+            <a:r>
+              <a:rPr lang="en-US" altLang="ko-KR" dirty="0"/>
+              <a:t>PLC1</a:t>
+            </a:r>
+            <a:r>
+              <a:rPr lang="ko-KR" altLang="en-US" dirty="0"/>
+              <a:t>또는 </a:t>
+            </a:r>
+            <a:r>
+              <a:rPr lang="en-US" altLang="ko-KR" dirty="0"/>
+              <a:t>add runtime</a:t>
+            </a:r>
+            <a:r>
+              <a:rPr lang="ko-KR" altLang="en-US" dirty="0"/>
+              <a:t>으로 런타임 연결 </a:t>
+            </a:r>
+            <a:endParaRPr lang="en-US" altLang="ko-KR" dirty="0"/>
+          </a:p>
+          <a:p>
+            <a:r>
+              <a:rPr lang="ko-KR" altLang="en-US" dirty="0"/>
+              <a:t>포트 </a:t>
+            </a:r>
+            <a:r>
+              <a:rPr lang="ko-KR" altLang="en-US" dirty="0" err="1"/>
+              <a:t>클릭시</a:t>
+            </a:r>
+            <a:r>
+              <a:rPr lang="ko-KR" altLang="en-US" dirty="0"/>
+              <a:t> </a:t>
+            </a:r>
+            <a:r>
+              <a:rPr lang="en-US" altLang="ko-KR" dirty="0" err="1"/>
+              <a:t>c++</a:t>
+            </a:r>
+            <a:r>
+              <a:rPr lang="en-US" altLang="ko-KR" dirty="0"/>
+              <a:t>task </a:t>
+            </a:r>
+            <a:r>
+              <a:rPr lang="ko-KR" altLang="en-US" dirty="0"/>
+              <a:t>클릭</a:t>
+            </a:r>
+            <a:endParaRPr lang="en-US" altLang="ko-KR" dirty="0"/>
+          </a:p>
+          <a:p>
+            <a:r>
+              <a:rPr lang="ko-KR" altLang="en-US" dirty="0"/>
+              <a:t>연결</a:t>
+            </a:r>
+            <a:endParaRPr lang="en-US" altLang="ko-KR" dirty="0"/>
+          </a:p>
+          <a:p>
+            <a:r>
+              <a:rPr lang="ko-KR" altLang="en-US" dirty="0"/>
+              <a:t>포트 </a:t>
+            </a:r>
+            <a:r>
+              <a:rPr lang="ko-KR" altLang="en-US" dirty="0" err="1"/>
+              <a:t>검색시</a:t>
+            </a:r>
+            <a:r>
+              <a:rPr lang="ko-KR" altLang="en-US" dirty="0"/>
+              <a:t> </a:t>
+            </a:r>
+            <a:r>
+              <a:rPr lang="ko-KR" altLang="en-US" dirty="0" err="1"/>
+              <a:t>트윈캣</a:t>
+            </a:r>
+            <a:r>
+              <a:rPr lang="ko-KR" altLang="en-US" dirty="0"/>
+              <a:t> 런타임 </a:t>
+            </a:r>
+            <a:r>
+              <a:rPr lang="ko-KR" altLang="en-US" dirty="0" err="1"/>
+              <a:t>실행중이여야</a:t>
+            </a:r>
+            <a:r>
+              <a:rPr lang="ko-KR" altLang="en-US" dirty="0"/>
+              <a:t> 함</a:t>
+            </a:r>
+          </a:p>
+        </p:txBody>
+      </p:sp>
+      <p:pic>
+        <p:nvPicPr>
+          <p:cNvPr id="5" name="그림 4">
+            <a:extLst>
+              <a:ext uri="{FF2B5EF4-FFF2-40B4-BE49-F238E27FC236}">
+                <a16:creationId xmlns:a16="http://schemas.microsoft.com/office/drawing/2014/main" id="{4C21AD43-67D5-4FDD-AB4F-2C4581CCF554}"/>
+              </a:ext>
+            </a:extLst>
+          </p:cNvPr>
+          <p:cNvPicPr>
+            <a:picLocks noChangeAspect="1"/>
+          </p:cNvPicPr>
+          <p:nvPr/>
+        </p:nvPicPr>
+        <p:blipFill>
+          <a:blip r:embed="rId2"/>
+          <a:stretch>
+            <a:fillRect/>
+          </a:stretch>
+        </p:blipFill>
+        <p:spPr>
+          <a:xfrm>
+            <a:off x="5269776" y="1018778"/>
+            <a:ext cx="6569799" cy="4820444"/>
+          </a:xfrm>
+          <a:prstGeom prst="rect">
+            <a:avLst/>
+          </a:prstGeom>
+        </p:spPr>
+      </p:pic>
+      <p:pic>
+        <p:nvPicPr>
+          <p:cNvPr id="3074" name="Picture 2">
+            <a:extLst>
+              <a:ext uri="{FF2B5EF4-FFF2-40B4-BE49-F238E27FC236}">
+                <a16:creationId xmlns:a16="http://schemas.microsoft.com/office/drawing/2014/main" id="{9D03A126-1EA0-408E-BC32-76CF3FDFD4E5}"/>
+              </a:ext>
+            </a:extLst>
+          </p:cNvPr>
+          <p:cNvPicPr>
+            <a:picLocks noChangeAspect="1" noChangeArrowheads="1"/>
+          </p:cNvPicPr>
+          <p:nvPr/>
+        </p:nvPicPr>
+        <p:blipFill rotWithShape="1">
+          <a:blip r:embed="rId3">
+            <a:extLst>
+              <a:ext uri="{28A0092B-C50C-407E-A947-70E740481C1C}">
+                <a14:useLocalDpi xmlns:a14="http://schemas.microsoft.com/office/drawing/2010/main" val="0"/>
+              </a:ext>
+            </a:extLst>
+          </a:blip>
+          <a:srcRect t="48586"/>
+          <a:stretch/>
+        </p:blipFill>
+        <p:spPr bwMode="auto">
+          <a:xfrm>
+            <a:off x="9005888" y="5648325"/>
+            <a:ext cx="2547937" cy="762268"/>
+          </a:xfrm>
+          <a:prstGeom prst="rect">
+            <a:avLst/>
+          </a:prstGeom>
+          <a:noFill/>
+          <a:extLst>
+            <a:ext uri="{909E8E84-426E-40DD-AFC4-6F175D3DCCD1}">
+              <a14:hiddenFill xmlns:a14="http://schemas.microsoft.com/office/drawing/2010/main">
+                <a:solidFill>
+                  <a:srgbClr val="FFFFFF"/>
+                </a:solidFill>
+              </a14:hiddenFill>
+            </a:ext>
+          </a:extLst>
+        </p:spPr>
+      </p:pic>
+    </p:spTree>
+    <p:extLst>
+      <p:ext uri="{BB962C8B-B14F-4D97-AF65-F5344CB8AC3E}">
+        <p14:creationId xmlns:p14="http://schemas.microsoft.com/office/powerpoint/2010/main" val="2479386598"/>
+      </p:ext>
+    </p:extLst>
+  </p:cSld>
+  <p:clrMapOvr>
+    <a:masterClrMapping/>
+  </p:clrMapOvr>
+</p:sld>
+</file>
+
+<file path=ppt/slides/slide41.xml><?xml version="1.0" encoding="utf-8"?>
+<p:sld xmlns:a="http://schemas.openxmlformats.org/drawingml/2006/main" xmlns:r="http://schemas.openxmlformats.org/officeDocument/2006/relationships" xmlns:p="http://schemas.openxmlformats.org/presentationml/2006/main">
+  <p:cSld>
+    <p:spTree>
+      <p:nvGrpSpPr>
+        <p:cNvPr id="1" name=""/>
+        <p:cNvGrpSpPr/>
+        <p:nvPr/>
+      </p:nvGrpSpPr>
+      <p:grpSpPr>
+        <a:xfrm>
+          <a:off x="0" y="0"/>
+          <a:ext cx="0" cy="0"/>
+          <a:chOff x="0" y="0"/>
+          <a:chExt cx="0" cy="0"/>
+        </a:xfrm>
+      </p:grpSpPr>
+      <p:sp>
+        <p:nvSpPr>
+          <p:cNvPr id="2" name="제목 1">
+            <a:extLst>
+              <a:ext uri="{FF2B5EF4-FFF2-40B4-BE49-F238E27FC236}">
                 <a16:creationId xmlns:a16="http://schemas.microsoft.com/office/drawing/2014/main" id="{F14D607D-5A6B-4819-B4FD-96EA5DF31712}"/>
               </a:ext>
             </a:extLst>
@@ -11914,7 +12165,7 @@
 </p:sld>
 </file>
 
-<file path=ppt/slides/slide41.xml><?xml version="1.0" encoding="utf-8"?>
+<file path=ppt/slides/slide42.xml><?xml version="1.0" encoding="utf-8"?>
 <p:sld xmlns:a="http://schemas.openxmlformats.org/drawingml/2006/main" xmlns:r="http://schemas.openxmlformats.org/officeDocument/2006/relationships" xmlns:p="http://schemas.openxmlformats.org/presentationml/2006/main">
   <p:cSld>
     <p:spTree>
@@ -12130,7 +12381,7 @@
 </p:sld>
 </file>
 
-<file path=ppt/slides/slide42.xml><?xml version="1.0" encoding="utf-8"?>
+<file path=ppt/slides/slide43.xml><?xml version="1.0" encoding="utf-8"?>
 <p:sld xmlns:a="http://schemas.openxmlformats.org/drawingml/2006/main" xmlns:r="http://schemas.openxmlformats.org/officeDocument/2006/relationships" xmlns:p="http://schemas.openxmlformats.org/presentationml/2006/main">
   <p:cSld>
     <p:spTree>
@@ -12327,7 +12578,7 @@
 </p:sld>
 </file>
 
-<file path=ppt/slides/slide43.xml><?xml version="1.0" encoding="utf-8"?>
+<file path=ppt/slides/slide44.xml><?xml version="1.0" encoding="utf-8"?>
 <p:sld xmlns:a="http://schemas.openxmlformats.org/drawingml/2006/main" xmlns:r="http://schemas.openxmlformats.org/officeDocument/2006/relationships" xmlns:p="http://schemas.openxmlformats.org/presentationml/2006/main">
   <p:cSld>
     <p:spTree>
@@ -12563,7 +12814,7 @@
 </p:sld>
 </file>
 
-<file path=ppt/slides/slide44.xml><?xml version="1.0" encoding="utf-8"?>
+<file path=ppt/slides/slide45.xml><?xml version="1.0" encoding="utf-8"?>
 <p:sld xmlns:a="http://schemas.openxmlformats.org/drawingml/2006/main" xmlns:r="http://schemas.openxmlformats.org/officeDocument/2006/relationships" xmlns:p="http://schemas.openxmlformats.org/presentationml/2006/main">
   <p:cSld>
     <p:spTree>
@@ -12722,7 +12973,7 @@
 </p:sld>
 </file>
 
-<file path=ppt/slides/slide45.xml><?xml version="1.0" encoding="utf-8"?>
+<file path=ppt/slides/slide46.xml><?xml version="1.0" encoding="utf-8"?>
 <p:sld xmlns:a="http://schemas.openxmlformats.org/drawingml/2006/main" xmlns:r="http://schemas.openxmlformats.org/officeDocument/2006/relationships" xmlns:p="http://schemas.openxmlformats.org/presentationml/2006/main">
   <p:cSld>
     <p:spTree>
@@ -12904,7 +13155,7 @@
 </p:sld>
 </file>
 
-<file path=ppt/slides/slide46.xml><?xml version="1.0" encoding="utf-8"?>
+<file path=ppt/slides/slide47.xml><?xml version="1.0" encoding="utf-8"?>
 <p:sld xmlns:a="http://schemas.openxmlformats.org/drawingml/2006/main" xmlns:r="http://schemas.openxmlformats.org/officeDocument/2006/relationships" xmlns:p="http://schemas.openxmlformats.org/presentationml/2006/main">
   <p:cSld>
     <p:spTree>
@@ -13056,7 +13307,7 @@
 </p:sld>
 </file>
 
-<file path=ppt/slides/slide47.xml><?xml version="1.0" encoding="utf-8"?>
+<file path=ppt/slides/slide48.xml><?xml version="1.0" encoding="utf-8"?>
 <p:sld xmlns:a="http://schemas.openxmlformats.org/drawingml/2006/main" xmlns:r="http://schemas.openxmlformats.org/officeDocument/2006/relationships" xmlns:p="http://schemas.openxmlformats.org/presentationml/2006/main">
   <p:cSld>
     <p:spTree>
@@ -13286,7 +13537,7 @@
 </p:sld>
 </file>
 
-<file path=ppt/slides/slide48.xml><?xml version="1.0" encoding="utf-8"?>
+<file path=ppt/slides/slide49.xml><?xml version="1.0" encoding="utf-8"?>
 <p:sld xmlns:a="http://schemas.openxmlformats.org/drawingml/2006/main" xmlns:r="http://schemas.openxmlformats.org/officeDocument/2006/relationships" xmlns:p="http://schemas.openxmlformats.org/presentationml/2006/main">
   <p:cSld>
     <p:spTree>
@@ -13572,202 +13823,6 @@
     <p:extLst>
       <p:ext uri="{BB962C8B-B14F-4D97-AF65-F5344CB8AC3E}">
         <p14:creationId xmlns:p14="http://schemas.microsoft.com/office/powerpoint/2010/main" val="2374742987"/>
-      </p:ext>
-    </p:extLst>
-  </p:cSld>
-  <p:clrMapOvr>
-    <a:masterClrMapping/>
-  </p:clrMapOvr>
-</p:sld>
-</file>
-
-<file path=ppt/slides/slide49.xml><?xml version="1.0" encoding="utf-8"?>
-<p:sld xmlns:a="http://schemas.openxmlformats.org/drawingml/2006/main" xmlns:r="http://schemas.openxmlformats.org/officeDocument/2006/relationships" xmlns:p="http://schemas.openxmlformats.org/presentationml/2006/main">
-  <p:cSld>
-    <p:spTree>
-      <p:nvGrpSpPr>
-        <p:cNvPr id="1" name=""/>
-        <p:cNvGrpSpPr/>
-        <p:nvPr/>
-      </p:nvGrpSpPr>
-      <p:grpSpPr>
-        <a:xfrm>
-          <a:off x="0" y="0"/>
-          <a:ext cx="0" cy="0"/>
-          <a:chOff x="0" y="0"/>
-          <a:chExt cx="0" cy="0"/>
-        </a:xfrm>
-      </p:grpSpPr>
-      <p:sp>
-        <p:nvSpPr>
-          <p:cNvPr id="2" name="제목 1">
-            <a:extLst>
-              <a:ext uri="{FF2B5EF4-FFF2-40B4-BE49-F238E27FC236}">
-                <a16:creationId xmlns:a16="http://schemas.microsoft.com/office/drawing/2014/main" id="{C101CFA0-03DD-4A11-8A71-C21A14D3C939}"/>
-              </a:ext>
-            </a:extLst>
-          </p:cNvPr>
-          <p:cNvSpPr>
-            <a:spLocks noGrp="1"/>
-          </p:cNvSpPr>
-          <p:nvPr>
-            <p:ph type="title"/>
-          </p:nvPr>
-        </p:nvSpPr>
-        <p:spPr/>
-        <p:txBody>
-          <a:bodyPr/>
-          <a:lstStyle/>
-          <a:p>
-            <a:r>
-              <a:rPr lang="en-US" altLang="ko-KR" dirty="0"/>
-              <a:t>Ex) </a:t>
-            </a:r>
-            <a:r>
-              <a:rPr lang="en-US" altLang="ko-KR" dirty="0" err="1"/>
-              <a:t>textblock+button</a:t>
-            </a:r>
-            <a:endParaRPr lang="ko-KR" altLang="en-US" dirty="0"/>
-          </a:p>
-        </p:txBody>
-      </p:sp>
-      <p:sp>
-        <p:nvSpPr>
-          <p:cNvPr id="3" name="내용 개체 틀 2">
-            <a:extLst>
-              <a:ext uri="{FF2B5EF4-FFF2-40B4-BE49-F238E27FC236}">
-                <a16:creationId xmlns:a16="http://schemas.microsoft.com/office/drawing/2014/main" id="{B73F471F-48E0-4614-AE95-1E660E2F4EB4}"/>
-              </a:ext>
-            </a:extLst>
-          </p:cNvPr>
-          <p:cNvSpPr>
-            <a:spLocks noGrp="1"/>
-          </p:cNvSpPr>
-          <p:nvPr>
-            <p:ph idx="1"/>
-          </p:nvPr>
-        </p:nvSpPr>
-        <p:spPr>
-          <a:xfrm>
-            <a:off x="838200" y="1825625"/>
-            <a:ext cx="6871138" cy="4351338"/>
-          </a:xfrm>
-        </p:spPr>
-        <p:txBody>
-          <a:bodyPr/>
-          <a:lstStyle/>
-          <a:p>
-            <a:r>
-              <a:rPr lang="ko-KR" altLang="en-US" dirty="0"/>
-              <a:t>버튼 텍스트에 심볼을 링크해서 버튼 조작 테스트가 가능함</a:t>
-            </a:r>
-            <a:r>
-              <a:rPr lang="en-US" altLang="ko-KR" dirty="0"/>
-              <a:t>. </a:t>
-            </a:r>
-          </a:p>
-          <a:p>
-            <a:pPr marL="0" indent="0">
-              <a:buNone/>
-            </a:pPr>
-            <a:endParaRPr lang="ko-KR" altLang="en-US" dirty="0"/>
-          </a:p>
-        </p:txBody>
-      </p:sp>
-      <p:pic>
-        <p:nvPicPr>
-          <p:cNvPr id="5" name="그림 4">
-            <a:extLst>
-              <a:ext uri="{FF2B5EF4-FFF2-40B4-BE49-F238E27FC236}">
-                <a16:creationId xmlns:a16="http://schemas.microsoft.com/office/drawing/2014/main" id="{6990198C-5247-49B0-ABD2-0D3B43995E25}"/>
-              </a:ext>
-            </a:extLst>
-          </p:cNvPr>
-          <p:cNvPicPr>
-            <a:picLocks noChangeAspect="1"/>
-          </p:cNvPicPr>
-          <p:nvPr/>
-        </p:nvPicPr>
-        <p:blipFill>
-          <a:blip r:embed="rId2"/>
-          <a:stretch>
-            <a:fillRect/>
-          </a:stretch>
-        </p:blipFill>
-        <p:spPr>
-          <a:xfrm>
-            <a:off x="7898042" y="365125"/>
-            <a:ext cx="3714286" cy="3771429"/>
-          </a:xfrm>
-          <a:prstGeom prst="rect">
-            <a:avLst/>
-          </a:prstGeom>
-        </p:spPr>
-      </p:pic>
-      <p:pic>
-        <p:nvPicPr>
-          <p:cNvPr id="7" name="그림 6">
-            <a:extLst>
-              <a:ext uri="{FF2B5EF4-FFF2-40B4-BE49-F238E27FC236}">
-                <a16:creationId xmlns:a16="http://schemas.microsoft.com/office/drawing/2014/main" id="{348374C1-3342-4974-AC0B-66EAF88DF8CA}"/>
-              </a:ext>
-            </a:extLst>
-          </p:cNvPr>
-          <p:cNvPicPr>
-            <a:picLocks noChangeAspect="1"/>
-          </p:cNvPicPr>
-          <p:nvPr/>
-        </p:nvPicPr>
-        <p:blipFill>
-          <a:blip r:embed="rId3"/>
-          <a:stretch>
-            <a:fillRect/>
-          </a:stretch>
-        </p:blipFill>
-        <p:spPr>
-          <a:xfrm>
-            <a:off x="649496" y="3011704"/>
-            <a:ext cx="3559897" cy="2590647"/>
-          </a:xfrm>
-          <a:prstGeom prst="rect">
-            <a:avLst/>
-          </a:prstGeom>
-        </p:spPr>
-      </p:pic>
-      <p:pic>
-        <p:nvPicPr>
-          <p:cNvPr id="9" name="그림 8">
-            <a:extLst>
-              <a:ext uri="{FF2B5EF4-FFF2-40B4-BE49-F238E27FC236}">
-                <a16:creationId xmlns:a16="http://schemas.microsoft.com/office/drawing/2014/main" id="{95C5F192-2803-45D9-A454-804B975852EF}"/>
-              </a:ext>
-            </a:extLst>
-          </p:cNvPr>
-          <p:cNvPicPr>
-            <a:picLocks noChangeAspect="1"/>
-          </p:cNvPicPr>
-          <p:nvPr/>
-        </p:nvPicPr>
-        <p:blipFill>
-          <a:blip r:embed="rId4"/>
-          <a:stretch>
-            <a:fillRect/>
-          </a:stretch>
-        </p:blipFill>
-        <p:spPr>
-          <a:xfrm>
-            <a:off x="4268514" y="3531476"/>
-            <a:ext cx="3342589" cy="2070876"/>
-          </a:xfrm>
-          <a:prstGeom prst="rect">
-            <a:avLst/>
-          </a:prstGeom>
-        </p:spPr>
-      </p:pic>
-    </p:spTree>
-    <p:extLst>
-      <p:ext uri="{BB962C8B-B14F-4D97-AF65-F5344CB8AC3E}">
-        <p14:creationId xmlns:p14="http://schemas.microsoft.com/office/powerpoint/2010/main" val="1445159764"/>
       </p:ext>
     </p:extLst>
   </p:cSld>
@@ -14068,6 +14123,202 @@
 </file>
 
 <file path=ppt/slides/slide50.xml><?xml version="1.0" encoding="utf-8"?>
+<p:sld xmlns:a="http://schemas.openxmlformats.org/drawingml/2006/main" xmlns:r="http://schemas.openxmlformats.org/officeDocument/2006/relationships" xmlns:p="http://schemas.openxmlformats.org/presentationml/2006/main">
+  <p:cSld>
+    <p:spTree>
+      <p:nvGrpSpPr>
+        <p:cNvPr id="1" name=""/>
+        <p:cNvGrpSpPr/>
+        <p:nvPr/>
+      </p:nvGrpSpPr>
+      <p:grpSpPr>
+        <a:xfrm>
+          <a:off x="0" y="0"/>
+          <a:ext cx="0" cy="0"/>
+          <a:chOff x="0" y="0"/>
+          <a:chExt cx="0" cy="0"/>
+        </a:xfrm>
+      </p:grpSpPr>
+      <p:sp>
+        <p:nvSpPr>
+          <p:cNvPr id="2" name="제목 1">
+            <a:extLst>
+              <a:ext uri="{FF2B5EF4-FFF2-40B4-BE49-F238E27FC236}">
+                <a16:creationId xmlns:a16="http://schemas.microsoft.com/office/drawing/2014/main" id="{C101CFA0-03DD-4A11-8A71-C21A14D3C939}"/>
+              </a:ext>
+            </a:extLst>
+          </p:cNvPr>
+          <p:cNvSpPr>
+            <a:spLocks noGrp="1"/>
+          </p:cNvSpPr>
+          <p:nvPr>
+            <p:ph type="title"/>
+          </p:nvPr>
+        </p:nvSpPr>
+        <p:spPr/>
+        <p:txBody>
+          <a:bodyPr/>
+          <a:lstStyle/>
+          <a:p>
+            <a:r>
+              <a:rPr lang="en-US" altLang="ko-KR" dirty="0"/>
+              <a:t>Ex) </a:t>
+            </a:r>
+            <a:r>
+              <a:rPr lang="en-US" altLang="ko-KR" dirty="0" err="1"/>
+              <a:t>textblock+button</a:t>
+            </a:r>
+            <a:endParaRPr lang="ko-KR" altLang="en-US" dirty="0"/>
+          </a:p>
+        </p:txBody>
+      </p:sp>
+      <p:sp>
+        <p:nvSpPr>
+          <p:cNvPr id="3" name="내용 개체 틀 2">
+            <a:extLst>
+              <a:ext uri="{FF2B5EF4-FFF2-40B4-BE49-F238E27FC236}">
+                <a16:creationId xmlns:a16="http://schemas.microsoft.com/office/drawing/2014/main" id="{B73F471F-48E0-4614-AE95-1E660E2F4EB4}"/>
+              </a:ext>
+            </a:extLst>
+          </p:cNvPr>
+          <p:cNvSpPr>
+            <a:spLocks noGrp="1"/>
+          </p:cNvSpPr>
+          <p:nvPr>
+            <p:ph idx="1"/>
+          </p:nvPr>
+        </p:nvSpPr>
+        <p:spPr>
+          <a:xfrm>
+            <a:off x="838200" y="1825625"/>
+            <a:ext cx="6871138" cy="4351338"/>
+          </a:xfrm>
+        </p:spPr>
+        <p:txBody>
+          <a:bodyPr/>
+          <a:lstStyle/>
+          <a:p>
+            <a:r>
+              <a:rPr lang="ko-KR" altLang="en-US" dirty="0"/>
+              <a:t>버튼 텍스트에 심볼을 링크해서 버튼 조작 테스트가 가능함</a:t>
+            </a:r>
+            <a:r>
+              <a:rPr lang="en-US" altLang="ko-KR" dirty="0"/>
+              <a:t>. </a:t>
+            </a:r>
+          </a:p>
+          <a:p>
+            <a:pPr marL="0" indent="0">
+              <a:buNone/>
+            </a:pPr>
+            <a:endParaRPr lang="ko-KR" altLang="en-US" dirty="0"/>
+          </a:p>
+        </p:txBody>
+      </p:sp>
+      <p:pic>
+        <p:nvPicPr>
+          <p:cNvPr id="5" name="그림 4">
+            <a:extLst>
+              <a:ext uri="{FF2B5EF4-FFF2-40B4-BE49-F238E27FC236}">
+                <a16:creationId xmlns:a16="http://schemas.microsoft.com/office/drawing/2014/main" id="{6990198C-5247-49B0-ABD2-0D3B43995E25}"/>
+              </a:ext>
+            </a:extLst>
+          </p:cNvPr>
+          <p:cNvPicPr>
+            <a:picLocks noChangeAspect="1"/>
+          </p:cNvPicPr>
+          <p:nvPr/>
+        </p:nvPicPr>
+        <p:blipFill>
+          <a:blip r:embed="rId2"/>
+          <a:stretch>
+            <a:fillRect/>
+          </a:stretch>
+        </p:blipFill>
+        <p:spPr>
+          <a:xfrm>
+            <a:off x="7898042" y="365125"/>
+            <a:ext cx="3714286" cy="3771429"/>
+          </a:xfrm>
+          <a:prstGeom prst="rect">
+            <a:avLst/>
+          </a:prstGeom>
+        </p:spPr>
+      </p:pic>
+      <p:pic>
+        <p:nvPicPr>
+          <p:cNvPr id="7" name="그림 6">
+            <a:extLst>
+              <a:ext uri="{FF2B5EF4-FFF2-40B4-BE49-F238E27FC236}">
+                <a16:creationId xmlns:a16="http://schemas.microsoft.com/office/drawing/2014/main" id="{348374C1-3342-4974-AC0B-66EAF88DF8CA}"/>
+              </a:ext>
+            </a:extLst>
+          </p:cNvPr>
+          <p:cNvPicPr>
+            <a:picLocks noChangeAspect="1"/>
+          </p:cNvPicPr>
+          <p:nvPr/>
+        </p:nvPicPr>
+        <p:blipFill>
+          <a:blip r:embed="rId3"/>
+          <a:stretch>
+            <a:fillRect/>
+          </a:stretch>
+        </p:blipFill>
+        <p:spPr>
+          <a:xfrm>
+            <a:off x="649496" y="3011704"/>
+            <a:ext cx="3559897" cy="2590647"/>
+          </a:xfrm>
+          <a:prstGeom prst="rect">
+            <a:avLst/>
+          </a:prstGeom>
+        </p:spPr>
+      </p:pic>
+      <p:pic>
+        <p:nvPicPr>
+          <p:cNvPr id="9" name="그림 8">
+            <a:extLst>
+              <a:ext uri="{FF2B5EF4-FFF2-40B4-BE49-F238E27FC236}">
+                <a16:creationId xmlns:a16="http://schemas.microsoft.com/office/drawing/2014/main" id="{95C5F192-2803-45D9-A454-804B975852EF}"/>
+              </a:ext>
+            </a:extLst>
+          </p:cNvPr>
+          <p:cNvPicPr>
+            <a:picLocks noChangeAspect="1"/>
+          </p:cNvPicPr>
+          <p:nvPr/>
+        </p:nvPicPr>
+        <p:blipFill>
+          <a:blip r:embed="rId4"/>
+          <a:stretch>
+            <a:fillRect/>
+          </a:stretch>
+        </p:blipFill>
+        <p:spPr>
+          <a:xfrm>
+            <a:off x="4268514" y="3531476"/>
+            <a:ext cx="3342589" cy="2070876"/>
+          </a:xfrm>
+          <a:prstGeom prst="rect">
+            <a:avLst/>
+          </a:prstGeom>
+        </p:spPr>
+      </p:pic>
+    </p:spTree>
+    <p:extLst>
+      <p:ext uri="{BB962C8B-B14F-4D97-AF65-F5344CB8AC3E}">
+        <p14:creationId xmlns:p14="http://schemas.microsoft.com/office/powerpoint/2010/main" val="1445159764"/>
+      </p:ext>
+    </p:extLst>
+  </p:cSld>
+  <p:clrMapOvr>
+    <a:masterClrMapping/>
+  </p:clrMapOvr>
+</p:sld>
+</file>
+
+<file path=ppt/slides/slide51.xml><?xml version="1.0" encoding="utf-8"?>
 <p:sld xmlns:a="http://schemas.openxmlformats.org/drawingml/2006/main" xmlns:r="http://schemas.openxmlformats.org/officeDocument/2006/relationships" xmlns:p="http://schemas.openxmlformats.org/presentationml/2006/main">
   <p:cSld>
     <p:spTree>

</xml_diff>